<commit_message>
Update title slide dates and description.
</commit_message>
<xml_diff>
--- a/presentations/2023-04 Webinars/FHIR-Terminology-Part-2-2023-04-26.pptx
+++ b/presentations/2023-04 Webinars/FHIR-Terminology-Part-2-2023-04-26.pptx
@@ -9620,7 +9620,7 @@
             </a:br>
             <a:r>
               <a:rPr lang="en-US" dirty="0"/>
-              <a:t>Part 2 – Searching and Services</a:t>
+              <a:t>Parts 2 &amp; 3 – Searching and Services, Advanced Topics</a:t>
             </a:r>
           </a:p>
           <a:p>
@@ -9691,7 +9691,7 @@
           <a:p>
             <a:r>
               <a:rPr lang="en-US" dirty="0"/>
-              <a:t>2023-04-26</a:t>
+              <a:t>2023-04-26 - 2023-04-27</a:t>
             </a:r>
           </a:p>
           <a:p>
@@ -15411,7 +15411,7 @@
               <a:rPr lang="en-US" dirty="0">
                 <a:hlinkClick r:id="rId4"/>
               </a:rPr>
-              <a:t>https:///r4.ontoserver.csiro.au/fhir/CodeSystem/$subsumes?system=http://snomed.info/sct&amp;codeA=3738000&amp;codeB=3738000</a:t>
+              <a:t>https://r4.ontoserver.csiro.au/fhir/CodeSystem/$subsumes?system=http://snomed.info/sct&amp;codeA=3738000&amp;codeB=3738000</a:t>
             </a:r>
             <a:endParaRPr lang="en-US" dirty="0"/>
           </a:p>
@@ -20962,14 +20962,14 @@
               <a:t>Designations from code system supplements in Coding.display?</a:t>
             </a:r>
             <a:endParaRPr lang="en-US" dirty="0">
-              <a:hlinkClick r:id="rId4"/>
+              <a:hlinkClick r:id=""/>
             </a:endParaRPr>
           </a:p>
           <a:p>
             <a:pPr lvl="1"/>
             <a:r>
               <a:rPr lang="en-US" dirty="0">
-                <a:hlinkClick r:id="rId4"/>
+                <a:hlinkClick r:id=""/>
               </a:rPr>
               <a:t>Designations vs. language-specific resources for VS and CS</a:t>
             </a:r>

</xml_diff>